<commit_message>
update C_variable_mapping figure and caption
#43
</commit_message>
<xml_diff>
--- a/doc/manuscript/figures_tables/C_variable_mapping_fig.pptx
+++ b/doc/manuscript/figures_tables/C_variable_mapping_fig.pptx
@@ -198,7 +198,7 @@
           <a:p>
             <a:fld id="{DB657656-E537-AA48-B575-F7F3A3DBC2DD}" type="datetimeFigureOut">
               <a:rPr lang="en-US" smtClean="0"/>
-              <a:t>4/18/22</a:t>
+              <a:t>5/8/23</a:t>
             </a:fld>
             <a:endParaRPr lang="en-US"/>
           </a:p>
@@ -764,7 +764,7 @@
           <a:p>
             <a:fld id="{6298E0E3-79FA-3742-AA7B-873C13C8E065}" type="datetimeFigureOut">
               <a:rPr lang="en-US" smtClean="0"/>
-              <a:t>4/18/22</a:t>
+              <a:t>5/8/23</a:t>
             </a:fld>
             <a:endParaRPr lang="en-US"/>
           </a:p>
@@ -934,7 +934,7 @@
           <a:p>
             <a:fld id="{6298E0E3-79FA-3742-AA7B-873C13C8E065}" type="datetimeFigureOut">
               <a:rPr lang="en-US" smtClean="0"/>
-              <a:t>4/18/22</a:t>
+              <a:t>5/8/23</a:t>
             </a:fld>
             <a:endParaRPr lang="en-US"/>
           </a:p>
@@ -1114,7 +1114,7 @@
           <a:p>
             <a:fld id="{6298E0E3-79FA-3742-AA7B-873C13C8E065}" type="datetimeFigureOut">
               <a:rPr lang="en-US" smtClean="0"/>
-              <a:t>4/18/22</a:t>
+              <a:t>5/8/23</a:t>
             </a:fld>
             <a:endParaRPr lang="en-US"/>
           </a:p>
@@ -1284,7 +1284,7 @@
           <a:p>
             <a:fld id="{6298E0E3-79FA-3742-AA7B-873C13C8E065}" type="datetimeFigureOut">
               <a:rPr lang="en-US" smtClean="0"/>
-              <a:t>4/18/22</a:t>
+              <a:t>5/8/23</a:t>
             </a:fld>
             <a:endParaRPr lang="en-US"/>
           </a:p>
@@ -1528,7 +1528,7 @@
           <a:p>
             <a:fld id="{6298E0E3-79FA-3742-AA7B-873C13C8E065}" type="datetimeFigureOut">
               <a:rPr lang="en-US" smtClean="0"/>
-              <a:t>4/18/22</a:t>
+              <a:t>5/8/23</a:t>
             </a:fld>
             <a:endParaRPr lang="en-US"/>
           </a:p>
@@ -1760,7 +1760,7 @@
           <a:p>
             <a:fld id="{6298E0E3-79FA-3742-AA7B-873C13C8E065}" type="datetimeFigureOut">
               <a:rPr lang="en-US" smtClean="0"/>
-              <a:t>4/18/22</a:t>
+              <a:t>5/8/23</a:t>
             </a:fld>
             <a:endParaRPr lang="en-US"/>
           </a:p>
@@ -2127,7 +2127,7 @@
           <a:p>
             <a:fld id="{6298E0E3-79FA-3742-AA7B-873C13C8E065}" type="datetimeFigureOut">
               <a:rPr lang="en-US" smtClean="0"/>
-              <a:t>4/18/22</a:t>
+              <a:t>5/8/23</a:t>
             </a:fld>
             <a:endParaRPr lang="en-US"/>
           </a:p>
@@ -2245,7 +2245,7 @@
           <a:p>
             <a:fld id="{6298E0E3-79FA-3742-AA7B-873C13C8E065}" type="datetimeFigureOut">
               <a:rPr lang="en-US" smtClean="0"/>
-              <a:t>4/18/22</a:t>
+              <a:t>5/8/23</a:t>
             </a:fld>
             <a:endParaRPr lang="en-US"/>
           </a:p>
@@ -2340,7 +2340,7 @@
           <a:p>
             <a:fld id="{6298E0E3-79FA-3742-AA7B-873C13C8E065}" type="datetimeFigureOut">
               <a:rPr lang="en-US" smtClean="0"/>
-              <a:t>4/18/22</a:t>
+              <a:t>5/8/23</a:t>
             </a:fld>
             <a:endParaRPr lang="en-US"/>
           </a:p>
@@ -2617,7 +2617,7 @@
           <a:p>
             <a:fld id="{6298E0E3-79FA-3742-AA7B-873C13C8E065}" type="datetimeFigureOut">
               <a:rPr lang="en-US" smtClean="0"/>
-              <a:t>4/18/22</a:t>
+              <a:t>5/8/23</a:t>
             </a:fld>
             <a:endParaRPr lang="en-US"/>
           </a:p>
@@ -2874,7 +2874,7 @@
           <a:p>
             <a:fld id="{6298E0E3-79FA-3742-AA7B-873C13C8E065}" type="datetimeFigureOut">
               <a:rPr lang="en-US" smtClean="0"/>
-              <a:t>4/18/22</a:t>
+              <a:t>5/8/23</a:t>
             </a:fld>
             <a:endParaRPr lang="en-US"/>
           </a:p>
@@ -3087,7 +3087,7 @@
           <a:p>
             <a:fld id="{6298E0E3-79FA-3742-AA7B-873C13C8E065}" type="datetimeFigureOut">
               <a:rPr lang="en-US" smtClean="0"/>
-              <a:t>4/18/22</a:t>
+              <a:t>5/8/23</a:t>
             </a:fld>
             <a:endParaRPr lang="en-US"/>
           </a:p>
@@ -4056,15 +4056,15 @@
                     <a:schemeClr val="tx1"/>
                   </a:solidFill>
                 </a:rPr>
-                <a:t>ANPP_woody </a:t>
-              </a:r>
-              <a:r>
-                <a:rPr lang="en-US" sz="1000" i="1" baseline="30000" dirty="0" err="1">
-                  <a:solidFill>
-                    <a:schemeClr val="tx1"/>
-                  </a:solidFill>
-                </a:rPr>
-                <a:t>a,c</a:t>
+                <a:t>ANPP_woody(_stem) </a:t>
+              </a:r>
+              <a:r>
+                <a:rPr lang="en-US" sz="1000" i="1" baseline="30000" dirty="0">
+                  <a:solidFill>
+                    <a:schemeClr val="tx1"/>
+                  </a:solidFill>
+                </a:rPr>
+                <a:t>a-c</a:t>
               </a:r>
               <a:endParaRPr lang="en-US" sz="1000" dirty="0">
                 <a:solidFill>
@@ -5258,7 +5258,7 @@
                     <a:schemeClr val="tx1"/>
                   </a:solidFill>
                 </a:rPr>
-                <a:t>ANPP_foliage </a:t>
+                <a:t>ANPP_foliage/_litterfall </a:t>
               </a:r>
               <a:r>
                 <a:rPr lang="en-US" sz="1000" i="1" baseline="30000" dirty="0">
@@ -5332,7 +5332,7 @@
                     <a:schemeClr val="tx1"/>
                   </a:solidFill>
                 </a:rPr>
-                <a:t>▼ ANPP_foliage </a:t>
+                <a:t>▼ ANPP_foliage /_litterfall </a:t>
               </a:r>
               <a:r>
                 <a:rPr lang="en-US" sz="1000" i="1" baseline="30000" dirty="0">
@@ -6112,7 +6112,7 @@
                     <a:schemeClr val="tx1"/>
                   </a:solidFill>
                 </a:rPr>
-                <a:t>▲ </a:t>
+                <a:t>▲ (A)</a:t>
               </a:r>
               <a:r>
                 <a:rPr lang="en-US" sz="1000" i="1" dirty="0">

</xml_diff>

<commit_message>
small edit to figure
</commit_message>
<xml_diff>
--- a/doc/manuscript/figures_tables/C_variable_mapping_fig.pptx
+++ b/doc/manuscript/figures_tables/C_variable_mapping_fig.pptx
@@ -6115,12 +6115,20 @@
                 <a:t>▲ (A)</a:t>
               </a:r>
               <a:r>
+                <a:rPr lang="en-US" sz="1000" i="1" dirty="0" err="1">
+                  <a:solidFill>
+                    <a:schemeClr val="tx1"/>
+                  </a:solidFill>
+                </a:rPr>
+                <a:t>NPP_litter</a:t>
+              </a:r>
+              <a:r>
                 <a:rPr lang="en-US" sz="1000" i="1" dirty="0">
                   <a:solidFill>
                     <a:schemeClr val="tx1"/>
                   </a:solidFill>
                 </a:rPr>
-                <a:t>NPP_litterfall </a:t>
+                <a:t>(fall) </a:t>
               </a:r>
               <a:r>
                 <a:rPr lang="en-US" sz="1000" baseline="30000" dirty="0" err="1">

</xml_diff>

<commit_message>
exclude R_het_soil, knit in new display items
closes #51
closes #45
</commit_message>
<xml_diff>
--- a/doc/manuscript/figures_tables/C_variable_mapping_fig.pptx
+++ b/doc/manuscript/figures_tables/C_variable_mapping_fig.pptx
@@ -198,7 +198,7 @@
           <a:p>
             <a:fld id="{DB657656-E537-AA48-B575-F7F3A3DBC2DD}" type="datetimeFigureOut">
               <a:rPr lang="en-US" smtClean="0"/>
-              <a:t>5/8/23</a:t>
+              <a:t>5/23/23</a:t>
             </a:fld>
             <a:endParaRPr lang="en-US"/>
           </a:p>
@@ -764,7 +764,7 @@
           <a:p>
             <a:fld id="{6298E0E3-79FA-3742-AA7B-873C13C8E065}" type="datetimeFigureOut">
               <a:rPr lang="en-US" smtClean="0"/>
-              <a:t>5/8/23</a:t>
+              <a:t>5/23/23</a:t>
             </a:fld>
             <a:endParaRPr lang="en-US"/>
           </a:p>
@@ -934,7 +934,7 @@
           <a:p>
             <a:fld id="{6298E0E3-79FA-3742-AA7B-873C13C8E065}" type="datetimeFigureOut">
               <a:rPr lang="en-US" smtClean="0"/>
-              <a:t>5/8/23</a:t>
+              <a:t>5/23/23</a:t>
             </a:fld>
             <a:endParaRPr lang="en-US"/>
           </a:p>
@@ -1114,7 +1114,7 @@
           <a:p>
             <a:fld id="{6298E0E3-79FA-3742-AA7B-873C13C8E065}" type="datetimeFigureOut">
               <a:rPr lang="en-US" smtClean="0"/>
-              <a:t>5/8/23</a:t>
+              <a:t>5/23/23</a:t>
             </a:fld>
             <a:endParaRPr lang="en-US"/>
           </a:p>
@@ -1284,7 +1284,7 @@
           <a:p>
             <a:fld id="{6298E0E3-79FA-3742-AA7B-873C13C8E065}" type="datetimeFigureOut">
               <a:rPr lang="en-US" smtClean="0"/>
-              <a:t>5/8/23</a:t>
+              <a:t>5/23/23</a:t>
             </a:fld>
             <a:endParaRPr lang="en-US"/>
           </a:p>
@@ -1528,7 +1528,7 @@
           <a:p>
             <a:fld id="{6298E0E3-79FA-3742-AA7B-873C13C8E065}" type="datetimeFigureOut">
               <a:rPr lang="en-US" smtClean="0"/>
-              <a:t>5/8/23</a:t>
+              <a:t>5/23/23</a:t>
             </a:fld>
             <a:endParaRPr lang="en-US"/>
           </a:p>
@@ -1760,7 +1760,7 @@
           <a:p>
             <a:fld id="{6298E0E3-79FA-3742-AA7B-873C13C8E065}" type="datetimeFigureOut">
               <a:rPr lang="en-US" smtClean="0"/>
-              <a:t>5/8/23</a:t>
+              <a:t>5/23/23</a:t>
             </a:fld>
             <a:endParaRPr lang="en-US"/>
           </a:p>
@@ -2127,7 +2127,7 @@
           <a:p>
             <a:fld id="{6298E0E3-79FA-3742-AA7B-873C13C8E065}" type="datetimeFigureOut">
               <a:rPr lang="en-US" smtClean="0"/>
-              <a:t>5/8/23</a:t>
+              <a:t>5/23/23</a:t>
             </a:fld>
             <a:endParaRPr lang="en-US"/>
           </a:p>
@@ -2245,7 +2245,7 @@
           <a:p>
             <a:fld id="{6298E0E3-79FA-3742-AA7B-873C13C8E065}" type="datetimeFigureOut">
               <a:rPr lang="en-US" smtClean="0"/>
-              <a:t>5/8/23</a:t>
+              <a:t>5/23/23</a:t>
             </a:fld>
             <a:endParaRPr lang="en-US"/>
           </a:p>
@@ -2340,7 +2340,7 @@
           <a:p>
             <a:fld id="{6298E0E3-79FA-3742-AA7B-873C13C8E065}" type="datetimeFigureOut">
               <a:rPr lang="en-US" smtClean="0"/>
-              <a:t>5/8/23</a:t>
+              <a:t>5/23/23</a:t>
             </a:fld>
             <a:endParaRPr lang="en-US"/>
           </a:p>
@@ -2617,7 +2617,7 @@
           <a:p>
             <a:fld id="{6298E0E3-79FA-3742-AA7B-873C13C8E065}" type="datetimeFigureOut">
               <a:rPr lang="en-US" smtClean="0"/>
-              <a:t>5/8/23</a:t>
+              <a:t>5/23/23</a:t>
             </a:fld>
             <a:endParaRPr lang="en-US"/>
           </a:p>
@@ -2874,7 +2874,7 @@
           <a:p>
             <a:fld id="{6298E0E3-79FA-3742-AA7B-873C13C8E065}" type="datetimeFigureOut">
               <a:rPr lang="en-US" smtClean="0"/>
-              <a:t>5/8/23</a:t>
+              <a:t>5/23/23</a:t>
             </a:fld>
             <a:endParaRPr lang="en-US"/>
           </a:p>
@@ -3087,7 +3087,7 @@
           <a:p>
             <a:fld id="{6298E0E3-79FA-3742-AA7B-873C13C8E065}" type="datetimeFigureOut">
               <a:rPr lang="en-US" smtClean="0"/>
-              <a:t>5/8/23</a:t>
+              <a:t>5/23/23</a:t>
             </a:fld>
             <a:endParaRPr lang="en-US"/>
           </a:p>
@@ -6025,7 +6025,7 @@
                     <a:schemeClr val="tx1"/>
                   </a:solidFill>
                 </a:rPr>
-                <a:t>▼ R_het_soil</a:t>
+                <a:t>▼ R_het_soil**</a:t>
               </a:r>
               <a:endParaRPr lang="en-US" sz="1000" dirty="0">
                 <a:solidFill>

</xml_diff>